<commit_message>
little more info added for the web presentation
</commit_message>
<xml_diff>
--- a/FINAL_PROJECT_Web.pptx
+++ b/FINAL_PROJECT_Web.pptx
@@ -8,8 +8,10 @@
     <p:sldId id="314" r:id="rId5"/>
     <p:sldId id="315" r:id="rId6"/>
     <p:sldId id="316" r:id="rId7"/>
-    <p:sldId id="317" r:id="rId8"/>
-    <p:sldId id="318" r:id="rId9"/>
+    <p:sldId id="320" r:id="rId8"/>
+    <p:sldId id="321" r:id="rId9"/>
+    <p:sldId id="317" r:id="rId10"/>
+    <p:sldId id="318" r:id="rId11"/>
   </p:sldIdLst>
   <p:sldSz cx="12192000" cy="6858000"/>
   <p:notesSz cx="6858000" cy="9144000"/>
@@ -5828,7 +5830,7 @@
         <p:spPr>
           <a:xfrm>
             <a:off x="629639" y="4038037"/>
-            <a:ext cx="9589795" cy="2087424"/>
+            <a:ext cx="10475241" cy="2087424"/>
           </a:xfrm>
           <a:noFill/>
         </p:spPr>
@@ -5864,6 +5866,17 @@
                 <a:cs typeface="+mj-cs"/>
               </a:rPr>
               <a:t>WeB</a:t>
+            </a:r>
+            <a:r>
+              <a:rPr lang="en-US" sz="3400" kern="1200" dirty="0">
+                <a:solidFill>
+                  <a:schemeClr val="bg1"/>
+                </a:solidFill>
+                <a:latin typeface="+mj-lt"/>
+                <a:ea typeface="+mj-ea"/>
+                <a:cs typeface="+mj-cs"/>
+              </a:rPr>
+              <a:t> presentation</a:t>
             </a:r>
             <a:br>
               <a:rPr lang="en-US" sz="3400" kern="1200" dirty="0">
@@ -6596,6 +6609,418 @@
 </file>
 
 <file path=ppt/slides/slide4.xml><?xml version="1.0" encoding="utf-8"?>
+<p:sld xmlns:a="http://schemas.openxmlformats.org/drawingml/2006/main" xmlns:r="http://schemas.openxmlformats.org/officeDocument/2006/relationships" xmlns:p="http://schemas.openxmlformats.org/presentationml/2006/main">
+  <p:cSld>
+    <p:spTree>
+      <p:nvGrpSpPr>
+        <p:cNvPr id="1" name=""/>
+        <p:cNvGrpSpPr/>
+        <p:nvPr/>
+      </p:nvGrpSpPr>
+      <p:grpSpPr>
+        <a:xfrm>
+          <a:off x="0" y="0"/>
+          <a:ext cx="0" cy="0"/>
+          <a:chOff x="0" y="0"/>
+          <a:chExt cx="0" cy="0"/>
+        </a:xfrm>
+      </p:grpSpPr>
+      <p:sp>
+        <p:nvSpPr>
+          <p:cNvPr id="18" name="Title 17">
+            <a:extLst>
+              <a:ext uri="{FF2B5EF4-FFF2-40B4-BE49-F238E27FC236}">
+                <a16:creationId xmlns:a16="http://schemas.microsoft.com/office/drawing/2014/main" id="{A3A28A3F-DD50-002C-411B-D6C398B7E715}"/>
+              </a:ext>
+            </a:extLst>
+          </p:cNvPr>
+          <p:cNvSpPr>
+            <a:spLocks noGrp="1"/>
+          </p:cNvSpPr>
+          <p:nvPr>
+            <p:ph type="title"/>
+          </p:nvPr>
+        </p:nvSpPr>
+        <p:spPr>
+          <a:xfrm>
+            <a:off x="230124" y="492046"/>
+            <a:ext cx="11731752" cy="894080"/>
+          </a:xfrm>
+        </p:spPr>
+        <p:txBody>
+          <a:bodyPr/>
+          <a:lstStyle/>
+          <a:p>
+            <a:r>
+              <a:rPr lang="en-US" dirty="0"/>
+              <a:t>FINAL PROJECT Show off</a:t>
+            </a:r>
+            <a:br>
+              <a:rPr lang="en-US" dirty="0"/>
+            </a:br>
+            <a:r>
+              <a:rPr lang="en-US" sz="2400" dirty="0">
+                <a:solidFill>
+                  <a:srgbClr val="00B0F0"/>
+                </a:solidFill>
+              </a:rPr>
+              <a:t>SNEAKY score</a:t>
+            </a:r>
+            <a:br>
+              <a:rPr lang="en-US" dirty="0"/>
+            </a:br>
+            <a:endParaRPr lang="en-US" dirty="0"/>
+          </a:p>
+        </p:txBody>
+      </p:sp>
+      <p:sp>
+        <p:nvSpPr>
+          <p:cNvPr id="23" name="TextBox 22">
+            <a:extLst>
+              <a:ext uri="{FF2B5EF4-FFF2-40B4-BE49-F238E27FC236}">
+                <a16:creationId xmlns:a16="http://schemas.microsoft.com/office/drawing/2014/main" id="{F1D09ED3-0F4D-39C0-E437-ACFBD16ADCCF}"/>
+              </a:ext>
+            </a:extLst>
+          </p:cNvPr>
+          <p:cNvSpPr txBox="1"/>
+          <p:nvPr/>
+        </p:nvSpPr>
+        <p:spPr>
+          <a:xfrm>
+            <a:off x="8625840" y="1564640"/>
+            <a:ext cx="3180080" cy="4247317"/>
+          </a:xfrm>
+          <a:prstGeom prst="rect">
+            <a:avLst/>
+          </a:prstGeom>
+          <a:noFill/>
+        </p:spPr>
+        <p:txBody>
+          <a:bodyPr wrap="square" rtlCol="0">
+            <a:spAutoFit/>
+          </a:bodyPr>
+          <a:lstStyle/>
+          <a:p>
+            <a:r>
+              <a:rPr lang="en-US" dirty="0"/>
+              <a:t>OLS (Ordinary Least Square) </a:t>
+            </a:r>
+          </a:p>
+          <a:p>
+            <a:r>
+              <a:rPr lang="en-US" dirty="0"/>
+              <a:t>R squared / Adj. R-squared</a:t>
+            </a:r>
+          </a:p>
+          <a:p>
+            <a:r>
+              <a:rPr lang="en-US" dirty="0"/>
+              <a:t> = 0.026</a:t>
+            </a:r>
+          </a:p>
+          <a:p>
+            <a:r>
+              <a:rPr lang="en-US" dirty="0"/>
+              <a:t>Which measurement is calculated by Variability explained by regression / total variability of the dataset</a:t>
+            </a:r>
+          </a:p>
+          <a:p>
+            <a:endParaRPr lang="en-US" dirty="0"/>
+          </a:p>
+          <a:p>
+            <a:r>
+              <a:rPr lang="en-US" dirty="0"/>
+              <a:t>Close to zero means there is none of the variability which explains why the results are very similar one to another.</a:t>
+            </a:r>
+          </a:p>
+          <a:p>
+            <a:r>
+              <a:rPr lang="en-US" dirty="0"/>
+              <a:t>This tells that variability of our model is telling us 2%</a:t>
+            </a:r>
+          </a:p>
+          <a:p>
+            <a:endParaRPr lang="en-US" dirty="0"/>
+          </a:p>
+        </p:txBody>
+      </p:sp>
+      <p:pic>
+        <p:nvPicPr>
+          <p:cNvPr id="25" name="Picture 24">
+            <a:extLst>
+              <a:ext uri="{FF2B5EF4-FFF2-40B4-BE49-F238E27FC236}">
+                <a16:creationId xmlns:a16="http://schemas.microsoft.com/office/drawing/2014/main" id="{49904574-C198-4755-197C-2323C86AFE4F}"/>
+              </a:ext>
+            </a:extLst>
+          </p:cNvPr>
+          <p:cNvPicPr>
+            <a:picLocks noChangeAspect="1"/>
+          </p:cNvPicPr>
+          <p:nvPr/>
+        </p:nvPicPr>
+        <p:blipFill>
+          <a:blip r:embed="rId2"/>
+          <a:stretch>
+            <a:fillRect/>
+          </a:stretch>
+        </p:blipFill>
+        <p:spPr>
+          <a:xfrm>
+            <a:off x="1097280" y="1534160"/>
+            <a:ext cx="7487921" cy="4086225"/>
+          </a:xfrm>
+          <a:prstGeom prst="rect">
+            <a:avLst/>
+          </a:prstGeom>
+        </p:spPr>
+      </p:pic>
+    </p:spTree>
+    <p:extLst>
+      <p:ext uri="{BB962C8B-B14F-4D97-AF65-F5344CB8AC3E}">
+        <p14:creationId xmlns:p14="http://schemas.microsoft.com/office/powerpoint/2010/main" val="851963521"/>
+      </p:ext>
+    </p:extLst>
+  </p:cSld>
+  <p:clrMapOvr>
+    <a:masterClrMapping/>
+  </p:clrMapOvr>
+</p:sld>
+</file>
+
+<file path=ppt/slides/slide5.xml><?xml version="1.0" encoding="utf-8"?>
+<p:sld xmlns:a="http://schemas.openxmlformats.org/drawingml/2006/main" xmlns:r="http://schemas.openxmlformats.org/officeDocument/2006/relationships" xmlns:p="http://schemas.openxmlformats.org/presentationml/2006/main">
+  <p:cSld>
+    <p:spTree>
+      <p:nvGrpSpPr>
+        <p:cNvPr id="1" name=""/>
+        <p:cNvGrpSpPr/>
+        <p:nvPr/>
+      </p:nvGrpSpPr>
+      <p:grpSpPr>
+        <a:xfrm>
+          <a:off x="0" y="0"/>
+          <a:ext cx="0" cy="0"/>
+          <a:chOff x="0" y="0"/>
+          <a:chExt cx="0" cy="0"/>
+        </a:xfrm>
+      </p:grpSpPr>
+      <p:sp>
+        <p:nvSpPr>
+          <p:cNvPr id="2" name="Text Placeholder 1">
+            <a:extLst>
+              <a:ext uri="{FF2B5EF4-FFF2-40B4-BE49-F238E27FC236}">
+                <a16:creationId xmlns:a16="http://schemas.microsoft.com/office/drawing/2014/main" id="{A7EB239E-7FE8-D7B7-3391-E928D362327B}"/>
+              </a:ext>
+            </a:extLst>
+          </p:cNvPr>
+          <p:cNvSpPr>
+            <a:spLocks noGrp="1"/>
+          </p:cNvSpPr>
+          <p:nvPr>
+            <p:ph type="body" sz="quarter" idx="10"/>
+          </p:nvPr>
+        </p:nvSpPr>
+        <p:spPr>
+          <a:xfrm>
+            <a:off x="456182" y="1757680"/>
+            <a:ext cx="3638298" cy="396240"/>
+          </a:xfrm>
+        </p:spPr>
+        <p:txBody>
+          <a:bodyPr/>
+          <a:lstStyle/>
+          <a:p>
+            <a:r>
+              <a:rPr lang="en-US" sz="2400" dirty="0">
+                <a:solidFill>
+                  <a:srgbClr val="FF0000"/>
+                </a:solidFill>
+              </a:rPr>
+              <a:t>OMITTED VARIABLE BIAS:</a:t>
+            </a:r>
+          </a:p>
+          <a:p>
+            <a:endParaRPr lang="en-US" dirty="0">
+              <a:solidFill>
+                <a:srgbClr val="FF0000"/>
+              </a:solidFill>
+            </a:endParaRPr>
+          </a:p>
+        </p:txBody>
+      </p:sp>
+      <p:sp>
+        <p:nvSpPr>
+          <p:cNvPr id="18" name="Title 17">
+            <a:extLst>
+              <a:ext uri="{FF2B5EF4-FFF2-40B4-BE49-F238E27FC236}">
+                <a16:creationId xmlns:a16="http://schemas.microsoft.com/office/drawing/2014/main" id="{B8BE9072-B0A1-B05B-C492-DBB9189B9DCD}"/>
+              </a:ext>
+            </a:extLst>
+          </p:cNvPr>
+          <p:cNvSpPr>
+            <a:spLocks noGrp="1"/>
+          </p:cNvSpPr>
+          <p:nvPr>
+            <p:ph type="title"/>
+          </p:nvPr>
+        </p:nvSpPr>
+        <p:spPr>
+          <a:xfrm>
+            <a:off x="230124" y="457200"/>
+            <a:ext cx="11731752" cy="822960"/>
+          </a:xfrm>
+        </p:spPr>
+        <p:txBody>
+          <a:bodyPr/>
+          <a:lstStyle/>
+          <a:p>
+            <a:r>
+              <a:rPr lang="en-US" dirty="0"/>
+              <a:t>FINAL PROJECT Show off</a:t>
+            </a:r>
+            <a:br>
+              <a:rPr lang="en-US" dirty="0"/>
+            </a:br>
+            <a:r>
+              <a:rPr lang="en-US" sz="2400" dirty="0">
+                <a:solidFill>
+                  <a:srgbClr val="00B0F0"/>
+                </a:solidFill>
+              </a:rPr>
+              <a:t>SNEAKY score</a:t>
+            </a:r>
+            <a:endParaRPr lang="en-US" dirty="0"/>
+          </a:p>
+        </p:txBody>
+      </p:sp>
+      <p:sp>
+        <p:nvSpPr>
+          <p:cNvPr id="19" name="TextBox 18">
+            <a:extLst>
+              <a:ext uri="{FF2B5EF4-FFF2-40B4-BE49-F238E27FC236}">
+                <a16:creationId xmlns:a16="http://schemas.microsoft.com/office/drawing/2014/main" id="{7D17C9E3-9A17-C734-2781-B4EBAB440911}"/>
+              </a:ext>
+            </a:extLst>
+          </p:cNvPr>
+          <p:cNvSpPr txBox="1"/>
+          <p:nvPr/>
+        </p:nvSpPr>
+        <p:spPr>
+          <a:xfrm>
+            <a:off x="456182" y="2397760"/>
+            <a:ext cx="10557258" cy="3416320"/>
+          </a:xfrm>
+          <a:prstGeom prst="rect">
+            <a:avLst/>
+          </a:prstGeom>
+          <a:noFill/>
+        </p:spPr>
+        <p:txBody>
+          <a:bodyPr wrap="square" rtlCol="0">
+            <a:spAutoFit/>
+          </a:bodyPr>
+          <a:lstStyle/>
+          <a:p>
+            <a:pPr marL="342900" indent="-342900">
+              <a:buFont typeface="+mj-lt"/>
+              <a:buAutoNum type="arabicPeriod"/>
+            </a:pPr>
+            <a:r>
+              <a:rPr lang="en-US" dirty="0"/>
+              <a:t>Where do we draw the sample from?  Secondary Car Insurance Company</a:t>
+            </a:r>
+          </a:p>
+          <a:p>
+            <a:pPr marL="342900" indent="-342900">
+              <a:buFont typeface="+mj-lt"/>
+              <a:buAutoNum type="arabicPeriod"/>
+            </a:pPr>
+            <a:r>
+              <a:rPr lang="en-US" dirty="0"/>
+              <a:t>Why the predictions were similar?  Co-Variance were lower, meaning credit scores were concentrated in higher credit score</a:t>
+            </a:r>
+          </a:p>
+          <a:p>
+            <a:pPr marL="342900" indent="-342900">
+              <a:buFont typeface="+mj-lt"/>
+              <a:buAutoNum type="arabicPeriod"/>
+            </a:pPr>
+            <a:r>
+              <a:rPr lang="en-US" dirty="0"/>
+              <a:t>Was it significant to add cars to predict better score?  No.  The car variable wasn’t predicting the better score than without</a:t>
+            </a:r>
+          </a:p>
+          <a:p>
+            <a:pPr marL="342900" indent="-342900">
+              <a:buFont typeface="+mj-lt"/>
+              <a:buAutoNum type="arabicPeriod"/>
+            </a:pPr>
+            <a:endParaRPr lang="en-US" dirty="0"/>
+          </a:p>
+          <a:p>
+            <a:pPr marL="342900" indent="-342900">
+              <a:buFont typeface="Arial" panose="020B0604020202020204" pitchFamily="34" charset="0"/>
+              <a:buChar char="•"/>
+            </a:pPr>
+            <a:r>
+              <a:rPr lang="en-US" dirty="0"/>
+              <a:t>These Omitted Variable Bias were very Sneaky, in other words, it crawled upon us and produced very narrowed predictions</a:t>
+            </a:r>
+          </a:p>
+          <a:p>
+            <a:pPr marL="342900" indent="-342900">
+              <a:buFont typeface="Arial" panose="020B0604020202020204" pitchFamily="34" charset="0"/>
+              <a:buChar char="•"/>
+            </a:pPr>
+            <a:endParaRPr lang="en-US" dirty="0"/>
+          </a:p>
+          <a:p>
+            <a:pPr marL="342900" indent="-342900">
+              <a:buFont typeface="Arial" panose="020B0604020202020204" pitchFamily="34" charset="0"/>
+              <a:buChar char="•"/>
+            </a:pPr>
+            <a:r>
+              <a:rPr lang="en-US" dirty="0"/>
+              <a:t>However, too late to go back, let’s continue.  </a:t>
+            </a:r>
+            <a:r>
+              <a:rPr lang="en-US" dirty="0">
+                <a:sym typeface="Wingdings" panose="05000000000000000000" pitchFamily="2" charset="2"/>
+              </a:rPr>
+              <a:t></a:t>
+            </a:r>
+            <a:endParaRPr lang="en-US" dirty="0"/>
+          </a:p>
+          <a:p>
+            <a:pPr marL="342900" indent="-342900">
+              <a:buFont typeface="+mj-lt"/>
+              <a:buAutoNum type="arabicPeriod"/>
+            </a:pPr>
+            <a:endParaRPr lang="en-US" dirty="0"/>
+          </a:p>
+          <a:p>
+            <a:pPr marL="342900" indent="-342900">
+              <a:buFont typeface="+mj-lt"/>
+              <a:buAutoNum type="arabicPeriod"/>
+            </a:pPr>
+            <a:endParaRPr lang="en-US" dirty="0"/>
+          </a:p>
+        </p:txBody>
+      </p:sp>
+    </p:spTree>
+    <p:extLst>
+      <p:ext uri="{BB962C8B-B14F-4D97-AF65-F5344CB8AC3E}">
+        <p14:creationId xmlns:p14="http://schemas.microsoft.com/office/powerpoint/2010/main" val="1035245304"/>
+      </p:ext>
+    </p:extLst>
+  </p:cSld>
+  <p:clrMapOvr>
+    <a:masterClrMapping/>
+  </p:clrMapOvr>
+</p:sld>
+</file>
+
+<file path=ppt/slides/slide6.xml><?xml version="1.0" encoding="utf-8"?>
 <p:sld xmlns:a="http://schemas.openxmlformats.org/drawingml/2006/main" xmlns:r="http://schemas.openxmlformats.org/officeDocument/2006/relationships" xmlns:p="http://schemas.openxmlformats.org/presentationml/2006/main">
   <p:cSld>
     <p:spTree>
@@ -7543,7 +7968,7 @@
 </p:sld>
 </file>
 
-<file path=ppt/slides/slide5.xml><?xml version="1.0" encoding="utf-8"?>
+<file path=ppt/slides/slide7.xml><?xml version="1.0" encoding="utf-8"?>
 <p:sld xmlns:a="http://schemas.openxmlformats.org/drawingml/2006/main" xmlns:r="http://schemas.openxmlformats.org/officeDocument/2006/relationships" xmlns:p="http://schemas.openxmlformats.org/presentationml/2006/main">
   <p:cSld>
     <p:spTree>
@@ -7623,7 +8048,7 @@
         <p:spPr>
           <a:xfrm>
             <a:off x="1198485" y="2645546"/>
-            <a:ext cx="9277165" cy="3139321"/>
+            <a:ext cx="9277165" cy="2887329"/>
           </a:xfrm>
           <a:prstGeom prst="rect">
             <a:avLst/>
@@ -7636,25 +8061,64 @@
           </a:bodyPr>
           <a:lstStyle/>
           <a:p>
-            <a:r>
-              <a:rPr lang="en-US" b="1" dirty="0" err="1"/>
+            <a:pPr marL="0" marR="0">
+              <a:lnSpc>
+                <a:spcPct val="107000"/>
+              </a:lnSpc>
+              <a:spcBef>
+                <a:spcPts val="0"/>
+              </a:spcBef>
+              <a:spcAft>
+                <a:spcPts val="800"/>
+              </a:spcAft>
+            </a:pPr>
+            <a:r>
+              <a:rPr lang="en-US" sz="1800" b="1" dirty="0" err="1">
+                <a:effectLst/>
+                <a:latin typeface="Calibri" panose="020F0502020204030204" pitchFamily="34" charset="0"/>
+                <a:ea typeface="Calibri" panose="020F0502020204030204" pitchFamily="34" charset="0"/>
+                <a:cs typeface="Times New Roman" panose="02020603050405020304" pitchFamily="18" charset="0"/>
+              </a:rPr>
               <a:t>StreamLit</a:t>
             </a:r>
             <a:r>
-              <a:rPr lang="en-US" dirty="0"/>
-              <a:t> is an open source app framework in python language.  It is compatible with major Python Libraries , especially for Machine Learning and Data Science projects.</a:t>
-            </a:r>
-          </a:p>
-          <a:p>
-            <a:endParaRPr lang="en-US" dirty="0"/>
-          </a:p>
-          <a:p>
-            <a:r>
-              <a:rPr lang="en-US" b="1" dirty="0"/>
+              <a:rPr lang="en-US" sz="1800" dirty="0">
+                <a:effectLst/>
+                <a:latin typeface="Calibri" panose="020F0502020204030204" pitchFamily="34" charset="0"/>
+                <a:ea typeface="Calibri" panose="020F0502020204030204" pitchFamily="34" charset="0"/>
+                <a:cs typeface="Times New Roman" panose="02020603050405020304" pitchFamily="18" charset="0"/>
+              </a:rPr>
+              <a:t> is an open-source app framework in python language.  It is compatible with major Python Libraries, especially for Machine Learning and Data Science projects.</a:t>
+            </a:r>
+          </a:p>
+          <a:p>
+            <a:pPr marL="0" marR="0">
+              <a:lnSpc>
+                <a:spcPct val="107000"/>
+              </a:lnSpc>
+              <a:spcBef>
+                <a:spcPts val="0"/>
+              </a:spcBef>
+              <a:spcAft>
+                <a:spcPts val="800"/>
+              </a:spcAft>
+            </a:pPr>
+            <a:r>
+              <a:rPr lang="en-US" sz="1800" b="1" dirty="0">
+                <a:effectLst/>
+                <a:latin typeface="Calibri" panose="020F0502020204030204" pitchFamily="34" charset="0"/>
+                <a:ea typeface="Calibri" panose="020F0502020204030204" pitchFamily="34" charset="0"/>
+                <a:cs typeface="Times New Roman" panose="02020603050405020304" pitchFamily="18" charset="0"/>
+              </a:rPr>
               <a:t>Pickle</a:t>
             </a:r>
             <a:r>
-              <a:rPr lang="en-US" dirty="0"/>
+              <a:rPr lang="en-US" sz="1800" dirty="0">
+                <a:effectLst/>
+                <a:latin typeface="Calibri" panose="020F0502020204030204" pitchFamily="34" charset="0"/>
+                <a:ea typeface="Calibri" panose="020F0502020204030204" pitchFamily="34" charset="0"/>
+                <a:cs typeface="Times New Roman" panose="02020603050405020304" pitchFamily="18" charset="0"/>
+              </a:rPr>
               <a:t>: in Python is primarily used in serializing and deserializing a Python object structure. In other words, it is the process of converting a Python object into a byte stream to store it in a file, maintain program state across sessions, or transport data over the network.</a:t>
             </a:r>
           </a:p>
@@ -7930,6 +8394,15 @@
 </file>
 
 <file path=customXml/item2.xml><?xml version="1.0" encoding="utf-8"?>
+<?mso-contentType ?>
+<FormTemplates xmlns="http://schemas.microsoft.com/sharepoint/v3/contenttype/forms">
+  <Display>DocumentLibraryForm</Display>
+  <Edit>DocumentLibraryForm</Edit>
+  <New>DocumentLibraryForm</New>
+</FormTemplates>
+</file>
+
+<file path=customXml/item3.xml><?xml version="1.0" encoding="utf-8"?>
 <ct:contentTypeSchema xmlns:ct="http://schemas.microsoft.com/office/2006/metadata/contentType" xmlns:ma="http://schemas.microsoft.com/office/2006/metadata/properties/metaAttributes" ct:_="" ma:_="" ma:contentTypeName="Document" ma:contentTypeID="0x01010079F111ED35F8CC479449609E8A0923A6" ma:contentTypeVersion="12" ma:contentTypeDescription="Create a new document." ma:contentTypeScope="" ma:versionID="426e97fa315356fffbdcd9876fe988c2">
   <xsd:schema xmlns:xsd="http://www.w3.org/2001/XMLSchema" xmlns:xs="http://www.w3.org/2001/XMLSchema" xmlns:p="http://schemas.microsoft.com/office/2006/metadata/properties" xmlns:ns2="71af3243-3dd4-4a8d-8c0d-dd76da1f02a5" xmlns:ns3="16c05727-aa75-4e4a-9b5f-8a80a1165891" targetNamespace="http://schemas.microsoft.com/office/2006/metadata/properties" ma:root="true" ma:fieldsID="14b8f0def80e6d70ce3def20c90759ae" ns2:_="" ns3:_="">
     <xsd:import namespace="71af3243-3dd4-4a8d-8c0d-dd76da1f02a5"/>
@@ -8150,15 +8623,6 @@
 </ct:contentTypeSchema>
 </file>
 
-<file path=customXml/item3.xml><?xml version="1.0" encoding="utf-8"?>
-<?mso-contentType ?>
-<FormTemplates xmlns="http://schemas.microsoft.com/sharepoint/v3/contenttype/forms">
-  <Display>DocumentLibraryForm</Display>
-  <Edit>DocumentLibraryForm</Edit>
-  <New>DocumentLibraryForm</New>
-</FormTemplates>
-</file>
-
 <file path=customXml/itemProps1.xml><?xml version="1.0" encoding="utf-8"?>
 <ds:datastoreItem xmlns:ds="http://schemas.openxmlformats.org/officeDocument/2006/customXml" ds:itemID="{B211B2B9-8CE5-4E5A-B70F-6B056FE844E8}">
   <ds:schemaRefs>
@@ -8170,6 +8634,14 @@
 </file>
 
 <file path=customXml/itemProps2.xml><?xml version="1.0" encoding="utf-8"?>
+<ds:datastoreItem xmlns:ds="http://schemas.openxmlformats.org/officeDocument/2006/customXml" ds:itemID="{466BA265-3C9C-41FF-80C6-61A7F961C0DC}">
+  <ds:schemaRefs>
+    <ds:schemaRef ds:uri="http://schemas.microsoft.com/sharepoint/v3/contenttype/forms"/>
+  </ds:schemaRefs>
+</ds:datastoreItem>
+</file>
+
+<file path=customXml/itemProps3.xml><?xml version="1.0" encoding="utf-8"?>
 <ds:datastoreItem xmlns:ds="http://schemas.openxmlformats.org/officeDocument/2006/customXml" ds:itemID="{5055BC56-8FA3-435B-ACDD-0E8E6241EF63}">
   <ds:schemaRefs>
     <ds:schemaRef ds:uri="http://schemas.microsoft.com/office/2006/metadata/contentType"/>
@@ -8186,12 +8658,4 @@
     <ds:schemaRef ds:uri="http://schemas.microsoft.com/internal/obd"/>
   </ds:schemaRefs>
 </ds:datastoreItem>
-</file>
-
-<file path=customXml/itemProps3.xml><?xml version="1.0" encoding="utf-8"?>
-<ds:datastoreItem xmlns:ds="http://schemas.openxmlformats.org/officeDocument/2006/customXml" ds:itemID="{466BA265-3C9C-41FF-80C6-61A7F961C0DC}">
-  <ds:schemaRefs>
-    <ds:schemaRef ds:uri="http://schemas.microsoft.com/sharepoint/v3/contenttype/forms"/>
-  </ds:schemaRefs>
-</ds:datastoreItem>
 </file>
</xml_diff>

<commit_message>
Statiscal explaination of the outcome
</commit_message>
<xml_diff>
--- a/FINAL_PROJECT_Web.pptx
+++ b/FINAL_PROJECT_Web.pptx
@@ -9,9 +9,10 @@
     <p:sldId id="315" r:id="rId6"/>
     <p:sldId id="316" r:id="rId7"/>
     <p:sldId id="320" r:id="rId8"/>
-    <p:sldId id="321" r:id="rId9"/>
-    <p:sldId id="317" r:id="rId10"/>
-    <p:sldId id="318" r:id="rId11"/>
+    <p:sldId id="323" r:id="rId9"/>
+    <p:sldId id="321" r:id="rId10"/>
+    <p:sldId id="317" r:id="rId11"/>
+    <p:sldId id="318" r:id="rId12"/>
   </p:sldIdLst>
   <p:sldSz cx="12192000" cy="6858000"/>
   <p:notesSz cx="6858000" cy="9144000"/>
@@ -129,6 +130,258 @@
 </p:presentation>
 </file>
 
+<file path=ppt/ink/ink1.xml><?xml version="1.0" encoding="utf-8"?>
+<inkml:ink xmlns:inkml="http://www.w3.org/2003/InkML">
+  <inkml:definitions>
+    <inkml:context xml:id="ctx0">
+      <inkml:inkSource xml:id="inkSrc0">
+        <inkml:traceFormat>
+          <inkml:channel name="X" type="integer" min="-2.14748E9" max="2.14748E9" units="cm"/>
+          <inkml:channel name="Y" type="integer" min="-2.14748E9" max="2.14748E9" units="cm"/>
+          <inkml:channel name="F" type="integer" max="32767" units="dev"/>
+        </inkml:traceFormat>
+        <inkml:channelProperties>
+          <inkml:channelProperty channel="X" name="resolution" value="1000" units="1/cm"/>
+          <inkml:channelProperty channel="Y" name="resolution" value="1000" units="1/cm"/>
+          <inkml:channelProperty channel="F" name="resolution" value="0" units="1/dev"/>
+        </inkml:channelProperties>
+      </inkml:inkSource>
+      <inkml:timestamp xml:id="ts0" timeString="2022-08-11T12:05:46.736"/>
+    </inkml:context>
+    <inkml:brush xml:id="br0">
+      <inkml:brushProperty name="width" value="0.05" units="cm"/>
+      <inkml:brushProperty name="height" value="0.05" units="cm"/>
+      <inkml:brushProperty name="color" value="#E71224"/>
+    </inkml:brush>
+  </inkml:definitions>
+  <inkml:trace contextRef="#ctx0" brushRef="#br0">1754 439 24575,'-1'-2'0,"1"0"0,-1 0 0,1 0 0,-1 0 0,0 0 0,0 1 0,0-1 0,0 0 0,0 1 0,0-1 0,0 0 0,0 1 0,-1-1 0,1 1 0,-1 0 0,1-1 0,-1 1 0,1 0 0,-1 0 0,0 0 0,-2-1 0,-44-19 0,38 17 0,-11-2 0,0 2 0,0 0 0,0 1 0,0 1 0,0 1 0,0 1 0,-23 2 0,-7 0 0,-214-2 0,-169 2 0,203 25 0,138-13 0,75-12 0,-1 1 0,1 1 0,0 1 0,-1 0 0,-21 11 0,32-12 0,0 0 0,1 1 0,-1 0 0,1 1 0,1-1 0,-1 1 0,1 0 0,0 1 0,0 0 0,1 0 0,-1 0 0,2 0 0,-7 13 0,-68 177 0,57-136 0,4-6 0,3-1 0,2 2 0,2 0 0,3 0 0,2 1 0,2 83 0,7 562 0,-2-684 0,1 0 0,1-1 0,1 0 0,0 1 0,9 21 0,7 28 0,-15-54 0,0-1 0,0 0 0,1 0 0,1-1 0,0 0 0,0 0 0,1 0 0,18 18 0,12 17 0,-5-4 0,1-1 0,2-2 0,48 40 0,-16-22 0,83 52 0,-106-81 0,1-2 0,1-2 0,1-2 0,63 20 0,15 5 0,-75-26 0,94 24 0,-78-33 0,1-3 0,1-3 0,-1-4 0,103-7 0,-114-1 0,-37 3 0,0 1 0,0 1 0,1 1 0,36 4 0,-5 7 0,-30-6 0,-1-1 0,32 2 0,-46-5 0,1-2 0,-1 1 0,1-1 0,-1 0 0,1 0 0,-1-1 0,0 0 0,0 0 0,0-1 0,0 0 0,7-4 0,126-68 0,-64 36 0,84-58 0,-137 81 0,-1-1 0,-2 0 0,1-2 0,-2 0 0,-1-2 0,0 0 0,27-44 0,-39 54 0,0 0 0,-1 0 0,0-1 0,-1 1 0,-1-1 0,0 0 0,0-1 0,-1 1 0,-1 0 0,1-18 0,1 6 0,1 0 0,1 0 0,1 0 0,10-25 0,-7 23 0,-1 1 0,-2-2 0,4-26 0,-8-44 0,-3 73 0,1 0 0,1 0 0,4-25 0,-2 40 0,0-1 0,1 1 0,-1-1 0,2 1 0,-1 1 0,7-10 0,-6 11 0,0-1 0,-1-1 0,0 1 0,0-1 0,-1 1 0,0-1 0,2-12 0,-3 7 0,-2 0 0,0 0 0,0 1 0,-2-1 0,0 1 0,0-1 0,-1 1 0,0-1 0,-8-16 0,-8-14 0,-31-55 0,32 66 0,-6-6 0,17 29 0,1 0 0,0 0 0,-8-21 0,7 17 0,-1 0 0,0 0 0,-1 1 0,0 0 0,-1 1 0,0 0 0,-1 1 0,0 0 0,-17-13 0,-39-41 0,57 55 0,1 0 0,-1 1 0,0 0 0,-1 1 0,0 0 0,-1 1 0,-13-7 0,19 11 0,1-1 0,0 1 0,0-1 0,0 0 0,0 0 0,1 0 0,-1-1 0,1 0 0,-6-9 0,1 3 0,-351-443 0,-31-38 0,388 489-49,-4-6 93,-1 0 0,0 1 0,-10-9-1,16 15-136,-1 1 0,1-1 0,-1 0-1,0 1 1,1-1 0,-1 1 0,0 0 0,0 0-1,0 0 1,0 1 0,0-1 0,0 1 0,-1-1-1,1 1 1,-5 0 0,-12 3-6733</inkml:trace>
+</inkml:ink>
+</file>
+
+<file path=ppt/ink/ink2.xml><?xml version="1.0" encoding="utf-8"?>
+<inkml:ink xmlns:inkml="http://www.w3.org/2003/InkML">
+  <inkml:definitions>
+    <inkml:context xml:id="ctx0">
+      <inkml:inkSource xml:id="inkSrc0">
+        <inkml:traceFormat>
+          <inkml:channel name="X" type="integer" min="-2.14748E9" max="2.14748E9" units="cm"/>
+          <inkml:channel name="Y" type="integer" min="-2.14748E9" max="2.14748E9" units="cm"/>
+          <inkml:channel name="F" type="integer" max="32767" units="dev"/>
+        </inkml:traceFormat>
+        <inkml:channelProperties>
+          <inkml:channelProperty channel="X" name="resolution" value="1000" units="1/cm"/>
+          <inkml:channelProperty channel="Y" name="resolution" value="1000" units="1/cm"/>
+          <inkml:channelProperty channel="F" name="resolution" value="0" units="1/dev"/>
+        </inkml:channelProperties>
+      </inkml:inkSource>
+      <inkml:timestamp xml:id="ts0" timeString="2022-08-11T12:05:35.517"/>
+    </inkml:context>
+    <inkml:brush xml:id="br0">
+      <inkml:brushProperty name="width" value="0.05" units="cm"/>
+      <inkml:brushProperty name="height" value="0.05" units="cm"/>
+      <inkml:brushProperty name="color" value="#E71224"/>
+    </inkml:brush>
+  </inkml:definitions>
+  <inkml:trace contextRef="#ctx0" brushRef="#br0">1704 498 24575,'-612'0'0,"593"1"0,1 1 0,-33 7 0,-25 3 0,54-9 0,0 0 0,0 2 0,0 0 0,-23 10 0,-37 10 0,20-13 0,34-8 0,0 2 0,1 1 0,-41 16 0,35-9 0,18-9 0,1 1 0,-27 16 0,-7 6 0,30-18 0,-34 25 0,46-30 0,1 0 0,-1 1 0,1-1 0,0 1 0,0 0 0,1 1 0,0-1 0,0 1 0,-3 7 0,-3 7 0,-1-2 0,-1 1 0,0-2 0,-19 23 0,-36 65 0,61-99 0,0 2 0,1-1 0,0 1 0,1 0 0,-1 0 0,2 0 0,-1 0 0,-2 15 0,0 5 0,-1 45 0,5-50 0,-9 43 0,6-47 0,2 0 0,-1 23 0,2-11 0,2 1 0,1 0 0,1 0 0,2 0 0,1-1 0,17 56 0,-12-60 0,0 2 0,2-1 0,0 0 0,20 32 0,-20-44 0,0 0 0,2 0 0,-1-1 0,2-1 0,17 15 0,86 57 0,-49-38 0,8 17 0,-60-49 0,1-1 0,1 0 0,1-1 0,30 17 0,-20-17 0,-11-4 0,0-1 0,1-1 0,38 11 0,-46-16 0,-1 0 0,1 1 0,11 6 0,22 9 0,-3-4 0,44 25 0,-21-10 0,-38-18 0,-1-2 0,2-1 0,-1-1 0,1-1 0,43 6 0,264 12 0,-201-14 0,-89-6 0,50 0 0,-76-6 0,4 1 0,0-1 0,0-1 0,0-1 0,0-1 0,0-1 0,0-1 0,31-11 0,-35 9 0,-14 5 0,1 0 0,-1 0 0,0 0 0,0-1 0,0 1 0,0-1 0,0-1 0,-1 1 0,1 0 0,-1-1 0,0 0 0,5-6 0,9-18 0,-1 0 0,-2-1 0,-1 0 0,12-35 0,7-16 0,-4 19 0,-4-2 0,-2-2 0,21-91 0,-36 101 0,-1 1 0,-3-1 0,-3 1 0,-9-103 0,-58-206 0,10 123 0,-151-399 0,196 614 0,-1 1 0,-1 0 0,-1 1 0,-1 1 0,-28-33 0,-34-47-1365,60 84-5461</inkml:trace>
+</inkml:ink>
+</file>
+
+<file path=ppt/ink/ink3.xml><?xml version="1.0" encoding="utf-8"?>
+<inkml:ink xmlns:inkml="http://www.w3.org/2003/InkML">
+  <inkml:definitions>
+    <inkml:context xml:id="ctx0">
+      <inkml:inkSource xml:id="inkSrc0">
+        <inkml:traceFormat>
+          <inkml:channel name="X" type="integer" min="-2.14748E9" max="2.14748E9" units="cm"/>
+          <inkml:channel name="Y" type="integer" min="-2.14748E9" max="2.14748E9" units="cm"/>
+          <inkml:channel name="F" type="integer" max="32767" units="dev"/>
+        </inkml:traceFormat>
+        <inkml:channelProperties>
+          <inkml:channelProperty channel="X" name="resolution" value="1000" units="1/cm"/>
+          <inkml:channelProperty channel="Y" name="resolution" value="1000" units="1/cm"/>
+          <inkml:channelProperty channel="F" name="resolution" value="0" units="1/dev"/>
+        </inkml:channelProperties>
+      </inkml:inkSource>
+      <inkml:timestamp xml:id="ts0" timeString="2022-08-11T12:05:56.897"/>
+    </inkml:context>
+    <inkml:brush xml:id="br0">
+      <inkml:brushProperty name="width" value="0.05" units="cm"/>
+      <inkml:brushProperty name="height" value="0.05" units="cm"/>
+      <inkml:brushProperty name="color" value="#E71224"/>
+    </inkml:brush>
+  </inkml:definitions>
+  <inkml:trace contextRef="#ctx0" brushRef="#br0">0 0 24575,'0'5'0</inkml:trace>
+</inkml:ink>
+</file>
+
+<file path=ppt/ink/ink4.xml><?xml version="1.0" encoding="utf-8"?>
+<inkml:ink xmlns:inkml="http://www.w3.org/2003/InkML">
+  <inkml:definitions>
+    <inkml:context xml:id="ctx0">
+      <inkml:inkSource xml:id="inkSrc0">
+        <inkml:traceFormat>
+          <inkml:channel name="X" type="integer" min="-2.14748E9" max="2.14748E9" units="cm"/>
+          <inkml:channel name="Y" type="integer" min="-2.14748E9" max="2.14748E9" units="cm"/>
+          <inkml:channel name="F" type="integer" max="32767" units="dev"/>
+        </inkml:traceFormat>
+        <inkml:channelProperties>
+          <inkml:channelProperty channel="X" name="resolution" value="1000" units="1/cm"/>
+          <inkml:channelProperty channel="Y" name="resolution" value="1000" units="1/cm"/>
+          <inkml:channelProperty channel="F" name="resolution" value="0" units="1/dev"/>
+        </inkml:channelProperties>
+      </inkml:inkSource>
+      <inkml:timestamp xml:id="ts0" timeString="2022-08-11T12:06:26.720"/>
+    </inkml:context>
+    <inkml:brush xml:id="br0">
+      <inkml:brushProperty name="width" value="0.05" units="cm"/>
+      <inkml:brushProperty name="height" value="0.05" units="cm"/>
+      <inkml:brushProperty name="color" value="#E71224"/>
+    </inkml:brush>
+  </inkml:definitions>
+  <inkml:trace contextRef="#ctx0" brushRef="#br0">1 0 24575,'0'0'-8191</inkml:trace>
+</inkml:ink>
+</file>
+
+<file path=ppt/ink/ink5.xml><?xml version="1.0" encoding="utf-8"?>
+<inkml:ink xmlns:inkml="http://www.w3.org/2003/InkML">
+  <inkml:definitions>
+    <inkml:context xml:id="ctx0">
+      <inkml:inkSource xml:id="inkSrc0">
+        <inkml:traceFormat>
+          <inkml:channel name="X" type="integer" min="-2.14748E9" max="2.14748E9" units="cm"/>
+          <inkml:channel name="Y" type="integer" min="-2.14748E9" max="2.14748E9" units="cm"/>
+          <inkml:channel name="F" type="integer" max="32767" units="dev"/>
+        </inkml:traceFormat>
+        <inkml:channelProperties>
+          <inkml:channelProperty channel="X" name="resolution" value="1000" units="1/cm"/>
+          <inkml:channelProperty channel="Y" name="resolution" value="1000" units="1/cm"/>
+          <inkml:channelProperty channel="F" name="resolution" value="0" units="1/dev"/>
+        </inkml:channelProperties>
+      </inkml:inkSource>
+      <inkml:timestamp xml:id="ts0" timeString="2022-08-11T12:06:40.133"/>
+    </inkml:context>
+    <inkml:brush xml:id="br0">
+      <inkml:brushProperty name="width" value="0.05" units="cm"/>
+      <inkml:brushProperty name="height" value="0.05" units="cm"/>
+      <inkml:brushProperty name="color" value="#E71224"/>
+    </inkml:brush>
+  </inkml:definitions>
+  <inkml:trace contextRef="#ctx0" brushRef="#br0">0 1 24575,'0'0'-8191</inkml:trace>
+</inkml:ink>
+</file>
+
+<file path=ppt/ink/ink6.xml><?xml version="1.0" encoding="utf-8"?>
+<inkml:ink xmlns:inkml="http://www.w3.org/2003/InkML">
+  <inkml:definitions>
+    <inkml:context xml:id="ctx0">
+      <inkml:inkSource xml:id="inkSrc0">
+        <inkml:traceFormat>
+          <inkml:channel name="X" type="integer" min="-2.14748E9" max="2.14748E9" units="cm"/>
+          <inkml:channel name="Y" type="integer" min="-2.14748E9" max="2.14748E9" units="cm"/>
+          <inkml:channel name="F" type="integer" max="32767" units="dev"/>
+        </inkml:traceFormat>
+        <inkml:channelProperties>
+          <inkml:channelProperty channel="X" name="resolution" value="1000" units="1/cm"/>
+          <inkml:channelProperty channel="Y" name="resolution" value="1000" units="1/cm"/>
+          <inkml:channelProperty channel="F" name="resolution" value="0" units="1/dev"/>
+        </inkml:channelProperties>
+      </inkml:inkSource>
+      <inkml:timestamp xml:id="ts0" timeString="2022-08-11T12:06:41.790"/>
+    </inkml:context>
+    <inkml:brush xml:id="br0">
+      <inkml:brushProperty name="width" value="0.05" units="cm"/>
+      <inkml:brushProperty name="height" value="0.05" units="cm"/>
+      <inkml:brushProperty name="color" value="#E71224"/>
+    </inkml:brush>
+  </inkml:definitions>
+  <inkml:trace contextRef="#ctx0" brushRef="#br0">0 0 24575,'0'0'-8191</inkml:trace>
+</inkml:ink>
+</file>
+
+<file path=ppt/ink/ink7.xml><?xml version="1.0" encoding="utf-8"?>
+<inkml:ink xmlns:inkml="http://www.w3.org/2003/InkML">
+  <inkml:definitions>
+    <inkml:context xml:id="ctx0">
+      <inkml:inkSource xml:id="inkSrc0">
+        <inkml:traceFormat>
+          <inkml:channel name="X" type="integer" min="-2.14748E9" max="2.14748E9" units="cm"/>
+          <inkml:channel name="Y" type="integer" min="-2.14748E9" max="2.14748E9" units="cm"/>
+          <inkml:channel name="F" type="integer" max="32767" units="dev"/>
+        </inkml:traceFormat>
+        <inkml:channelProperties>
+          <inkml:channelProperty channel="X" name="resolution" value="1000" units="1/cm"/>
+          <inkml:channelProperty channel="Y" name="resolution" value="1000" units="1/cm"/>
+          <inkml:channelProperty channel="F" name="resolution" value="0" units="1/dev"/>
+        </inkml:channelProperties>
+      </inkml:inkSource>
+      <inkml:timestamp xml:id="ts0" timeString="2022-08-11T12:06:42.148"/>
+    </inkml:context>
+    <inkml:brush xml:id="br0">
+      <inkml:brushProperty name="width" value="0.05" units="cm"/>
+      <inkml:brushProperty name="height" value="0.05" units="cm"/>
+      <inkml:brushProperty name="color" value="#E71224"/>
+    </inkml:brush>
+  </inkml:definitions>
+  <inkml:trace contextRef="#ctx0" brushRef="#br0">0 0 24575,'0'0'-8191</inkml:trace>
+</inkml:ink>
+</file>
+
+<file path=ppt/ink/ink8.xml><?xml version="1.0" encoding="utf-8"?>
+<inkml:ink xmlns:inkml="http://www.w3.org/2003/InkML">
+  <inkml:definitions>
+    <inkml:context xml:id="ctx0">
+      <inkml:inkSource xml:id="inkSrc0">
+        <inkml:traceFormat>
+          <inkml:channel name="X" type="integer" min="-2.14748E9" max="2.14748E9" units="cm"/>
+          <inkml:channel name="Y" type="integer" min="-2.14748E9" max="2.14748E9" units="cm"/>
+          <inkml:channel name="F" type="integer" max="32767" units="dev"/>
+        </inkml:traceFormat>
+        <inkml:channelProperties>
+          <inkml:channelProperty channel="X" name="resolution" value="1000" units="1/cm"/>
+          <inkml:channelProperty channel="Y" name="resolution" value="1000" units="1/cm"/>
+          <inkml:channelProperty channel="F" name="resolution" value="0" units="1/dev"/>
+        </inkml:channelProperties>
+      </inkml:inkSource>
+      <inkml:timestamp xml:id="ts0" timeString="2022-08-11T12:06:43.042"/>
+    </inkml:context>
+    <inkml:brush xml:id="br0">
+      <inkml:brushProperty name="width" value="0.05" units="cm"/>
+      <inkml:brushProperty name="height" value="0.05" units="cm"/>
+      <inkml:brushProperty name="color" value="#E71224"/>
+    </inkml:brush>
+  </inkml:definitions>
+  <inkml:trace contextRef="#ctx0" brushRef="#br0">5 1 24575,'-5'0'0</inkml:trace>
+</inkml:ink>
+</file>
+
+<file path=ppt/ink/ink9.xml><?xml version="1.0" encoding="utf-8"?>
+<inkml:ink xmlns:inkml="http://www.w3.org/2003/InkML">
+  <inkml:definitions>
+    <inkml:context xml:id="ctx0">
+      <inkml:inkSource xml:id="inkSrc0">
+        <inkml:traceFormat>
+          <inkml:channel name="X" type="integer" min="-2.14748E9" max="2.14748E9" units="cm"/>
+          <inkml:channel name="Y" type="integer" min="-2.14748E9" max="2.14748E9" units="cm"/>
+          <inkml:channel name="F" type="integer" max="32767" units="dev"/>
+        </inkml:traceFormat>
+        <inkml:channelProperties>
+          <inkml:channelProperty channel="X" name="resolution" value="1000" units="1/cm"/>
+          <inkml:channelProperty channel="Y" name="resolution" value="1000" units="1/cm"/>
+          <inkml:channelProperty channel="F" name="resolution" value="0" units="1/dev"/>
+        </inkml:channelProperties>
+      </inkml:inkSource>
+      <inkml:timestamp xml:id="ts0" timeString="2022-08-11T12:06:43.388"/>
+    </inkml:context>
+    <inkml:brush xml:id="br0">
+      <inkml:brushProperty name="width" value="0.05" units="cm"/>
+      <inkml:brushProperty name="height" value="0.05" units="cm"/>
+      <inkml:brushProperty name="color" value="#E71224"/>
+    </inkml:brush>
+  </inkml:definitions>
+  <inkml:trace contextRef="#ctx0" brushRef="#br0">1 1 24575,'0'0'-8191</inkml:trace>
+</inkml:ink>
+</file>
+
 <file path=ppt/slideLayouts/slideLayout1.xml><?xml version="1.0" encoding="utf-8"?>
 <p:sldLayout xmlns:a="http://schemas.openxmlformats.org/drawingml/2006/main" xmlns:r="http://schemas.openxmlformats.org/officeDocument/2006/relationships" xmlns:p="http://schemas.openxmlformats.org/presentationml/2006/main" preserve="1" userDrawn="1">
   <p:cSld name="Single Timeline">
@@ -3695,7 +3948,7 @@
           <a:p>
             <a:fld id="{B78FDAD0-21E9-42D0-8C63-C6563197FC13}" type="datetimeFigureOut">
               <a:rPr lang="en-US" smtClean="0"/>
-              <a:t>8/10/2022</a:t>
+              <a:t>8/11/2022</a:t>
             </a:fld>
             <a:endParaRPr lang="en-US"/>
           </a:p>
@@ -6664,7 +6917,7 @@
                   <a:srgbClr val="00B0F0"/>
                 </a:solidFill>
               </a:rPr>
-              <a:t>SNEAKY score</a:t>
+              <a:t>SNEAKY score – After math</a:t>
             </a:r>
             <a:br>
               <a:rPr lang="en-US" dirty="0"/>
@@ -6688,7 +6941,7 @@
         <p:spPr>
           <a:xfrm>
             <a:off x="8625840" y="1564640"/>
-            <a:ext cx="3180080" cy="4247317"/>
+            <a:ext cx="3180080" cy="4524315"/>
           </a:xfrm>
           <a:prstGeom prst="rect">
             <a:avLst/>
@@ -6702,6 +6955,12 @@
           <a:lstStyle/>
           <a:p>
             <a:r>
+              <a:rPr lang="en-US" b="1" dirty="0"/>
+              <a:t>Without CAR Variables</a:t>
+            </a:r>
+          </a:p>
+          <a:p>
+            <a:r>
               <a:rPr lang="en-US" dirty="0"/>
               <a:t>OLS (Ordinary Least Square) </a:t>
             </a:r>
@@ -6715,7 +6974,7 @@
           <a:p>
             <a:r>
               <a:rPr lang="en-US" dirty="0"/>
-              <a:t> = 0.026</a:t>
+              <a:t> = 0.009</a:t>
             </a:r>
           </a:p>
           <a:p>
@@ -6746,10 +7005,10 @@
       </p:sp>
       <p:pic>
         <p:nvPicPr>
-          <p:cNvPr id="25" name="Picture 24">
-            <a:extLst>
-              <a:ext uri="{FF2B5EF4-FFF2-40B4-BE49-F238E27FC236}">
-                <a16:creationId xmlns:a16="http://schemas.microsoft.com/office/drawing/2014/main" id="{49904574-C198-4755-197C-2323C86AFE4F}"/>
+          <p:cNvPr id="3" name="Picture 2">
+            <a:extLst>
+              <a:ext uri="{FF2B5EF4-FFF2-40B4-BE49-F238E27FC236}">
+                <a16:creationId xmlns:a16="http://schemas.microsoft.com/office/drawing/2014/main" id="{9A7E8E56-5581-1045-B497-FD2EB2CCDC99}"/>
               </a:ext>
             </a:extLst>
           </p:cNvPr>
@@ -6766,14 +7025,65 @@
         </p:blipFill>
         <p:spPr>
           <a:xfrm>
-            <a:off x="1097280" y="1534160"/>
-            <a:ext cx="7487921" cy="4086225"/>
+            <a:off x="635121" y="1476375"/>
+            <a:ext cx="7734300" cy="4533900"/>
           </a:xfrm>
           <a:prstGeom prst="rect">
             <a:avLst/>
           </a:prstGeom>
         </p:spPr>
       </p:pic>
+      <mc:AlternateContent xmlns:mc="http://schemas.openxmlformats.org/markup-compatibility/2006">
+        <mc:Choice xmlns:p14="http://schemas.microsoft.com/office/powerpoint/2010/main" Requires="p14">
+          <p:contentPart p14:bwMode="auto" r:id="rId3">
+            <p14:nvContentPartPr>
+              <p14:cNvPr id="4" name="Ink 3">
+                <a:extLst>
+                  <a:ext uri="{FF2B5EF4-FFF2-40B4-BE49-F238E27FC236}">
+                    <a16:creationId xmlns:a16="http://schemas.microsoft.com/office/drawing/2014/main" id="{8219F301-39AF-2B3F-0877-1FBFF38404CD}"/>
+                  </a:ext>
+                </a:extLst>
+              </p14:cNvPr>
+              <p14:cNvContentPartPr/>
+              <p14:nvPr/>
+            </p14:nvContentPartPr>
+            <p14:xfrm>
+              <a:off x="7243113" y="1519948"/>
+              <a:ext cx="1013040" cy="1079280"/>
+            </p14:xfrm>
+          </p:contentPart>
+        </mc:Choice>
+        <mc:Fallback>
+          <p:pic>
+            <p:nvPicPr>
+              <p:cNvPr id="4" name="Ink 3">
+                <a:extLst>
+                  <a:ext uri="{FF2B5EF4-FFF2-40B4-BE49-F238E27FC236}">
+                    <a16:creationId xmlns:a16="http://schemas.microsoft.com/office/drawing/2014/main" id="{8219F301-39AF-2B3F-0877-1FBFF38404CD}"/>
+                  </a:ext>
+                </a:extLst>
+              </p:cNvPr>
+              <p:cNvPicPr/>
+              <p:nvPr/>
+            </p:nvPicPr>
+            <p:blipFill>
+              <a:blip r:embed="rId4"/>
+              <a:stretch>
+                <a:fillRect/>
+              </a:stretch>
+            </p:blipFill>
+            <p:spPr>
+              <a:xfrm>
+                <a:off x="7234113" y="1510948"/>
+                <a:ext cx="1030680" cy="1096920"/>
+              </a:xfrm>
+              <a:prstGeom prst="rect">
+                <a:avLst/>
+              </a:prstGeom>
+            </p:spPr>
+          </p:pic>
+        </mc:Fallback>
+      </mc:AlternateContent>
     </p:spTree>
     <p:extLst>
       <p:ext uri="{BB962C8B-B14F-4D97-AF65-F5344CB8AC3E}">
@@ -6806,6 +7116,644 @@
       </p:grpSpPr>
       <p:sp>
         <p:nvSpPr>
+          <p:cNvPr id="18" name="Title 17">
+            <a:extLst>
+              <a:ext uri="{FF2B5EF4-FFF2-40B4-BE49-F238E27FC236}">
+                <a16:creationId xmlns:a16="http://schemas.microsoft.com/office/drawing/2014/main" id="{A3A28A3F-DD50-002C-411B-D6C398B7E715}"/>
+              </a:ext>
+            </a:extLst>
+          </p:cNvPr>
+          <p:cNvSpPr>
+            <a:spLocks noGrp="1"/>
+          </p:cNvSpPr>
+          <p:nvPr>
+            <p:ph type="title"/>
+          </p:nvPr>
+        </p:nvSpPr>
+        <p:spPr>
+          <a:xfrm>
+            <a:off x="230124" y="492046"/>
+            <a:ext cx="11731752" cy="894080"/>
+          </a:xfrm>
+        </p:spPr>
+        <p:txBody>
+          <a:bodyPr/>
+          <a:lstStyle/>
+          <a:p>
+            <a:r>
+              <a:rPr lang="en-US" dirty="0"/>
+              <a:t>FINAL PROJECT Show off</a:t>
+            </a:r>
+            <a:br>
+              <a:rPr lang="en-US" dirty="0"/>
+            </a:br>
+            <a:r>
+              <a:rPr lang="en-US" sz="2400" dirty="0">
+                <a:solidFill>
+                  <a:srgbClr val="00B0F0"/>
+                </a:solidFill>
+              </a:rPr>
+              <a:t>SNEAKY score –After math</a:t>
+            </a:r>
+            <a:br>
+              <a:rPr lang="en-US" dirty="0"/>
+            </a:br>
+            <a:endParaRPr lang="en-US" dirty="0"/>
+          </a:p>
+        </p:txBody>
+      </p:sp>
+      <p:sp>
+        <p:nvSpPr>
+          <p:cNvPr id="23" name="TextBox 22">
+            <a:extLst>
+              <a:ext uri="{FF2B5EF4-FFF2-40B4-BE49-F238E27FC236}">
+                <a16:creationId xmlns:a16="http://schemas.microsoft.com/office/drawing/2014/main" id="{F1D09ED3-0F4D-39C0-E437-ACFBD16ADCCF}"/>
+              </a:ext>
+            </a:extLst>
+          </p:cNvPr>
+          <p:cNvSpPr txBox="1"/>
+          <p:nvPr/>
+        </p:nvSpPr>
+        <p:spPr>
+          <a:xfrm>
+            <a:off x="8625840" y="1564640"/>
+            <a:ext cx="3180080" cy="4801314"/>
+          </a:xfrm>
+          <a:prstGeom prst="rect">
+            <a:avLst/>
+          </a:prstGeom>
+          <a:noFill/>
+        </p:spPr>
+        <p:txBody>
+          <a:bodyPr wrap="square" rtlCol="0">
+            <a:spAutoFit/>
+          </a:bodyPr>
+          <a:lstStyle/>
+          <a:p>
+            <a:r>
+              <a:rPr lang="en-US" b="1" dirty="0"/>
+              <a:t>With CAR Variables</a:t>
+            </a:r>
+          </a:p>
+          <a:p>
+            <a:endParaRPr lang="en-US" dirty="0"/>
+          </a:p>
+          <a:p>
+            <a:r>
+              <a:rPr lang="en-US" dirty="0"/>
+              <a:t>OLS (Ordinary Least Square) </a:t>
+            </a:r>
+          </a:p>
+          <a:p>
+            <a:r>
+              <a:rPr lang="en-US" dirty="0"/>
+              <a:t>R squared / Adj. R-squared</a:t>
+            </a:r>
+          </a:p>
+          <a:p>
+            <a:r>
+              <a:rPr lang="en-US" dirty="0"/>
+              <a:t> = 0.026</a:t>
+            </a:r>
+          </a:p>
+          <a:p>
+            <a:r>
+              <a:rPr lang="en-US" dirty="0"/>
+              <a:t>Which measurement is calculated by Variability explained by regression / total variability of the dataset</a:t>
+            </a:r>
+          </a:p>
+          <a:p>
+            <a:endParaRPr lang="en-US" dirty="0"/>
+          </a:p>
+          <a:p>
+            <a:r>
+              <a:rPr lang="en-US" dirty="0"/>
+              <a:t>Close to zero means there is none of the variability which explains why the results are very similar one to another.</a:t>
+            </a:r>
+          </a:p>
+          <a:p>
+            <a:r>
+              <a:rPr lang="en-US" dirty="0"/>
+              <a:t>This tells that variability of our model is telling us 2%</a:t>
+            </a:r>
+          </a:p>
+          <a:p>
+            <a:endParaRPr lang="en-US" dirty="0"/>
+          </a:p>
+        </p:txBody>
+      </p:sp>
+      <p:pic>
+        <p:nvPicPr>
+          <p:cNvPr id="25" name="Picture 24">
+            <a:extLst>
+              <a:ext uri="{FF2B5EF4-FFF2-40B4-BE49-F238E27FC236}">
+                <a16:creationId xmlns:a16="http://schemas.microsoft.com/office/drawing/2014/main" id="{49904574-C198-4755-197C-2323C86AFE4F}"/>
+              </a:ext>
+            </a:extLst>
+          </p:cNvPr>
+          <p:cNvPicPr>
+            <a:picLocks noChangeAspect="1"/>
+          </p:cNvPicPr>
+          <p:nvPr/>
+        </p:nvPicPr>
+        <p:blipFill>
+          <a:blip r:embed="rId2"/>
+          <a:stretch>
+            <a:fillRect/>
+          </a:stretch>
+        </p:blipFill>
+        <p:spPr>
+          <a:xfrm>
+            <a:off x="1097280" y="1534160"/>
+            <a:ext cx="7487921" cy="4086225"/>
+          </a:xfrm>
+          <a:prstGeom prst="rect">
+            <a:avLst/>
+          </a:prstGeom>
+        </p:spPr>
+      </p:pic>
+      <mc:AlternateContent xmlns:mc="http://schemas.openxmlformats.org/markup-compatibility/2006">
+        <mc:Choice xmlns:p14="http://schemas.microsoft.com/office/powerpoint/2010/main" Requires="p14">
+          <p:contentPart p14:bwMode="auto" r:id="rId3">
+            <p14:nvContentPartPr>
+              <p14:cNvPr id="9" name="Ink 8">
+                <a:extLst>
+                  <a:ext uri="{FF2B5EF4-FFF2-40B4-BE49-F238E27FC236}">
+                    <a16:creationId xmlns:a16="http://schemas.microsoft.com/office/drawing/2014/main" id="{DD66A90F-0B61-D0F4-5954-C3F8C54239D9}"/>
+                  </a:ext>
+                </a:extLst>
+              </p14:cNvPr>
+              <p14:cNvContentPartPr/>
+              <p14:nvPr/>
+            </p14:nvContentPartPr>
+            <p14:xfrm>
+              <a:off x="6754593" y="1738108"/>
+              <a:ext cx="878400" cy="934560"/>
+            </p14:xfrm>
+          </p:contentPart>
+        </mc:Choice>
+        <mc:Fallback>
+          <p:pic>
+            <p:nvPicPr>
+              <p:cNvPr id="9" name="Ink 8">
+                <a:extLst>
+                  <a:ext uri="{FF2B5EF4-FFF2-40B4-BE49-F238E27FC236}">
+                    <a16:creationId xmlns:a16="http://schemas.microsoft.com/office/drawing/2014/main" id="{DD66A90F-0B61-D0F4-5954-C3F8C54239D9}"/>
+                  </a:ext>
+                </a:extLst>
+              </p:cNvPr>
+              <p:cNvPicPr/>
+              <p:nvPr/>
+            </p:nvPicPr>
+            <p:blipFill>
+              <a:blip r:embed="rId4"/>
+              <a:stretch>
+                <a:fillRect/>
+              </a:stretch>
+            </p:blipFill>
+            <p:spPr>
+              <a:xfrm>
+                <a:off x="6745953" y="1729468"/>
+                <a:ext cx="896040" cy="952200"/>
+              </a:xfrm>
+              <a:prstGeom prst="rect">
+                <a:avLst/>
+              </a:prstGeom>
+            </p:spPr>
+          </p:pic>
+        </mc:Fallback>
+      </mc:AlternateContent>
+      <mc:AlternateContent xmlns:mc="http://schemas.openxmlformats.org/markup-compatibility/2006">
+        <mc:Choice xmlns:p14="http://schemas.microsoft.com/office/powerpoint/2010/main" Requires="p14">
+          <p:contentPart p14:bwMode="auto" r:id="rId5">
+            <p14:nvContentPartPr>
+              <p14:cNvPr id="10" name="Ink 9">
+                <a:extLst>
+                  <a:ext uri="{FF2B5EF4-FFF2-40B4-BE49-F238E27FC236}">
+                    <a16:creationId xmlns:a16="http://schemas.microsoft.com/office/drawing/2014/main" id="{3C588B13-C992-A798-B316-07E8CB41E43C}"/>
+                  </a:ext>
+                </a:extLst>
+              </p14:cNvPr>
+              <p14:cNvContentPartPr/>
+              <p14:nvPr/>
+            </p14:nvContentPartPr>
+            <p14:xfrm>
+              <a:off x="9108273" y="1721908"/>
+              <a:ext cx="360" cy="1800"/>
+            </p14:xfrm>
+          </p:contentPart>
+        </mc:Choice>
+        <mc:Fallback>
+          <p:pic>
+            <p:nvPicPr>
+              <p:cNvPr id="10" name="Ink 9">
+                <a:extLst>
+                  <a:ext uri="{FF2B5EF4-FFF2-40B4-BE49-F238E27FC236}">
+                    <a16:creationId xmlns:a16="http://schemas.microsoft.com/office/drawing/2014/main" id="{3C588B13-C992-A798-B316-07E8CB41E43C}"/>
+                  </a:ext>
+                </a:extLst>
+              </p:cNvPr>
+              <p:cNvPicPr/>
+              <p:nvPr/>
+            </p:nvPicPr>
+            <p:blipFill>
+              <a:blip r:embed="rId6"/>
+              <a:stretch>
+                <a:fillRect/>
+              </a:stretch>
+            </p:blipFill>
+            <p:spPr>
+              <a:xfrm>
+                <a:off x="9099273" y="1712908"/>
+                <a:ext cx="18000" cy="19440"/>
+              </a:xfrm>
+              <a:prstGeom prst="rect">
+                <a:avLst/>
+              </a:prstGeom>
+            </p:spPr>
+          </p:pic>
+        </mc:Fallback>
+      </mc:AlternateContent>
+      <mc:AlternateContent xmlns:mc="http://schemas.openxmlformats.org/markup-compatibility/2006">
+        <mc:Choice xmlns:p14="http://schemas.microsoft.com/office/powerpoint/2010/main" Requires="p14">
+          <p:contentPart p14:bwMode="auto" r:id="rId7">
+            <p14:nvContentPartPr>
+              <p14:cNvPr id="15" name="Ink 14">
+                <a:extLst>
+                  <a:ext uri="{FF2B5EF4-FFF2-40B4-BE49-F238E27FC236}">
+                    <a16:creationId xmlns:a16="http://schemas.microsoft.com/office/drawing/2014/main" id="{CDC130E3-3A00-552D-65FD-C2520B205A2C}"/>
+                  </a:ext>
+                </a:extLst>
+              </p14:cNvPr>
+              <p14:cNvContentPartPr/>
+              <p14:nvPr/>
+            </p14:nvContentPartPr>
+            <p14:xfrm>
+              <a:off x="10395273" y="3719548"/>
+              <a:ext cx="360" cy="360"/>
+            </p14:xfrm>
+          </p:contentPart>
+        </mc:Choice>
+        <mc:Fallback>
+          <p:pic>
+            <p:nvPicPr>
+              <p:cNvPr id="15" name="Ink 14">
+                <a:extLst>
+                  <a:ext uri="{FF2B5EF4-FFF2-40B4-BE49-F238E27FC236}">
+                    <a16:creationId xmlns:a16="http://schemas.microsoft.com/office/drawing/2014/main" id="{CDC130E3-3A00-552D-65FD-C2520B205A2C}"/>
+                  </a:ext>
+                </a:extLst>
+              </p:cNvPr>
+              <p:cNvPicPr/>
+              <p:nvPr/>
+            </p:nvPicPr>
+            <p:blipFill>
+              <a:blip r:embed="rId8"/>
+              <a:stretch>
+                <a:fillRect/>
+              </a:stretch>
+            </p:blipFill>
+            <p:spPr>
+              <a:xfrm>
+                <a:off x="10386633" y="3710548"/>
+                <a:ext cx="18000" cy="18000"/>
+              </a:xfrm>
+              <a:prstGeom prst="rect">
+                <a:avLst/>
+              </a:prstGeom>
+            </p:spPr>
+          </p:pic>
+        </mc:Fallback>
+      </mc:AlternateContent>
+      <mc:AlternateContent xmlns:mc="http://schemas.openxmlformats.org/markup-compatibility/2006">
+        <mc:Choice xmlns:p14="http://schemas.microsoft.com/office/powerpoint/2010/main" Requires="p14">
+          <p:contentPart p14:bwMode="auto" r:id="rId9">
+            <p14:nvContentPartPr>
+              <p14:cNvPr id="16" name="Ink 15">
+                <a:extLst>
+                  <a:ext uri="{FF2B5EF4-FFF2-40B4-BE49-F238E27FC236}">
+                    <a16:creationId xmlns:a16="http://schemas.microsoft.com/office/drawing/2014/main" id="{06DEE8BB-C3FB-9612-B284-7F67BF8C6141}"/>
+                  </a:ext>
+                </a:extLst>
+              </p14:cNvPr>
+              <p14:cNvContentPartPr/>
+              <p14:nvPr/>
+            </p14:nvContentPartPr>
+            <p14:xfrm>
+              <a:off x="9161553" y="4207708"/>
+              <a:ext cx="360" cy="360"/>
+            </p14:xfrm>
+          </p:contentPart>
+        </mc:Choice>
+        <mc:Fallback>
+          <p:pic>
+            <p:nvPicPr>
+              <p:cNvPr id="16" name="Ink 15">
+                <a:extLst>
+                  <a:ext uri="{FF2B5EF4-FFF2-40B4-BE49-F238E27FC236}">
+                    <a16:creationId xmlns:a16="http://schemas.microsoft.com/office/drawing/2014/main" id="{06DEE8BB-C3FB-9612-B284-7F67BF8C6141}"/>
+                  </a:ext>
+                </a:extLst>
+              </p:cNvPr>
+              <p:cNvPicPr/>
+              <p:nvPr/>
+            </p:nvPicPr>
+            <p:blipFill>
+              <a:blip r:embed="rId8"/>
+              <a:stretch>
+                <a:fillRect/>
+              </a:stretch>
+            </p:blipFill>
+            <p:spPr>
+              <a:xfrm>
+                <a:off x="9152553" y="4199068"/>
+                <a:ext cx="18000" cy="18000"/>
+              </a:xfrm>
+              <a:prstGeom prst="rect">
+                <a:avLst/>
+              </a:prstGeom>
+            </p:spPr>
+          </p:pic>
+        </mc:Fallback>
+      </mc:AlternateContent>
+      <p:grpSp>
+        <p:nvGrpSpPr>
+          <p:cNvPr id="20" name="Group 19">
+            <a:extLst>
+              <a:ext uri="{FF2B5EF4-FFF2-40B4-BE49-F238E27FC236}">
+                <a16:creationId xmlns:a16="http://schemas.microsoft.com/office/drawing/2014/main" id="{A28CDFD8-6C2E-F227-1526-9CDACCEB8378}"/>
+              </a:ext>
+            </a:extLst>
+          </p:cNvPr>
+          <p:cNvGrpSpPr/>
+          <p:nvPr/>
+        </p:nvGrpSpPr>
+        <p:grpSpPr>
+          <a:xfrm>
+            <a:off x="9400953" y="1775188"/>
+            <a:ext cx="360" cy="360"/>
+            <a:chOff x="9400953" y="1775188"/>
+            <a:chExt cx="360" cy="360"/>
+          </a:xfrm>
+        </p:grpSpPr>
+        <mc:AlternateContent xmlns:mc="http://schemas.openxmlformats.org/markup-compatibility/2006">
+          <mc:Choice xmlns:p14="http://schemas.microsoft.com/office/powerpoint/2010/main" Requires="p14">
+            <p:contentPart p14:bwMode="auto" r:id="rId10">
+              <p14:nvContentPartPr>
+                <p14:cNvPr id="17" name="Ink 16">
+                  <a:extLst>
+                    <a:ext uri="{FF2B5EF4-FFF2-40B4-BE49-F238E27FC236}">
+                      <a16:creationId xmlns:a16="http://schemas.microsoft.com/office/drawing/2014/main" id="{238AA03E-C092-434F-EAC1-B5BB5CB127C9}"/>
+                    </a:ext>
+                  </a:extLst>
+                </p14:cNvPr>
+                <p14:cNvContentPartPr/>
+                <p14:nvPr/>
+              </p14:nvContentPartPr>
+              <p14:xfrm>
+                <a:off x="9400953" y="1775188"/>
+                <a:ext cx="360" cy="360"/>
+              </p14:xfrm>
+            </p:contentPart>
+          </mc:Choice>
+          <mc:Fallback>
+            <p:pic>
+              <p:nvPicPr>
+                <p:cNvPr id="17" name="Ink 16">
+                  <a:extLst>
+                    <a:ext uri="{FF2B5EF4-FFF2-40B4-BE49-F238E27FC236}">
+                      <a16:creationId xmlns:a16="http://schemas.microsoft.com/office/drawing/2014/main" id="{238AA03E-C092-434F-EAC1-B5BB5CB127C9}"/>
+                    </a:ext>
+                  </a:extLst>
+                </p:cNvPr>
+                <p:cNvPicPr/>
+                <p:nvPr/>
+              </p:nvPicPr>
+              <p:blipFill>
+                <a:blip r:embed="rId8"/>
+                <a:stretch>
+                  <a:fillRect/>
+                </a:stretch>
+              </p:blipFill>
+              <p:spPr>
+                <a:xfrm>
+                  <a:off x="9391953" y="1766188"/>
+                  <a:ext cx="18000" cy="18000"/>
+                </a:xfrm>
+                <a:prstGeom prst="rect">
+                  <a:avLst/>
+                </a:prstGeom>
+              </p:spPr>
+            </p:pic>
+          </mc:Fallback>
+        </mc:AlternateContent>
+        <mc:AlternateContent xmlns:mc="http://schemas.openxmlformats.org/markup-compatibility/2006">
+          <mc:Choice xmlns:p14="http://schemas.microsoft.com/office/powerpoint/2010/main" Requires="p14">
+            <p:contentPart p14:bwMode="auto" r:id="rId11">
+              <p14:nvContentPartPr>
+                <p14:cNvPr id="19" name="Ink 18">
+                  <a:extLst>
+                    <a:ext uri="{FF2B5EF4-FFF2-40B4-BE49-F238E27FC236}">
+                      <a16:creationId xmlns:a16="http://schemas.microsoft.com/office/drawing/2014/main" id="{0A743330-21E6-156A-06CF-33EC476F6C41}"/>
+                    </a:ext>
+                  </a:extLst>
+                </p14:cNvPr>
+                <p14:cNvContentPartPr/>
+                <p14:nvPr/>
+              </p14:nvContentPartPr>
+              <p14:xfrm>
+                <a:off x="9400953" y="1775188"/>
+                <a:ext cx="360" cy="360"/>
+              </p14:xfrm>
+            </p:contentPart>
+          </mc:Choice>
+          <mc:Fallback>
+            <p:pic>
+              <p:nvPicPr>
+                <p:cNvPr id="19" name="Ink 18">
+                  <a:extLst>
+                    <a:ext uri="{FF2B5EF4-FFF2-40B4-BE49-F238E27FC236}">
+                      <a16:creationId xmlns:a16="http://schemas.microsoft.com/office/drawing/2014/main" id="{0A743330-21E6-156A-06CF-33EC476F6C41}"/>
+                    </a:ext>
+                  </a:extLst>
+                </p:cNvPr>
+                <p:cNvPicPr/>
+                <p:nvPr/>
+              </p:nvPicPr>
+              <p:blipFill>
+                <a:blip r:embed="rId8"/>
+                <a:stretch>
+                  <a:fillRect/>
+                </a:stretch>
+              </p:blipFill>
+              <p:spPr>
+                <a:xfrm>
+                  <a:off x="9391953" y="1766188"/>
+                  <a:ext cx="18000" cy="18000"/>
+                </a:xfrm>
+                <a:prstGeom prst="rect">
+                  <a:avLst/>
+                </a:prstGeom>
+              </p:spPr>
+            </p:pic>
+          </mc:Fallback>
+        </mc:AlternateContent>
+      </p:grpSp>
+      <p:grpSp>
+        <p:nvGrpSpPr>
+          <p:cNvPr id="24" name="Group 23">
+            <a:extLst>
+              <a:ext uri="{FF2B5EF4-FFF2-40B4-BE49-F238E27FC236}">
+                <a16:creationId xmlns:a16="http://schemas.microsoft.com/office/drawing/2014/main" id="{81C46E55-36AB-0B28-C438-F3AA33A6E10F}"/>
+              </a:ext>
+            </a:extLst>
+          </p:cNvPr>
+          <p:cNvGrpSpPr/>
+          <p:nvPr/>
+        </p:nvGrpSpPr>
+        <p:grpSpPr>
+          <a:xfrm>
+            <a:off x="10626033" y="2662948"/>
+            <a:ext cx="18360" cy="360"/>
+            <a:chOff x="10626033" y="2662948"/>
+            <a:chExt cx="18360" cy="360"/>
+          </a:xfrm>
+        </p:grpSpPr>
+        <mc:AlternateContent xmlns:mc="http://schemas.openxmlformats.org/markup-compatibility/2006">
+          <mc:Choice xmlns:p14="http://schemas.microsoft.com/office/powerpoint/2010/main" Requires="p14">
+            <p:contentPart p14:bwMode="auto" r:id="rId12">
+              <p14:nvContentPartPr>
+                <p14:cNvPr id="21" name="Ink 20">
+                  <a:extLst>
+                    <a:ext uri="{FF2B5EF4-FFF2-40B4-BE49-F238E27FC236}">
+                      <a16:creationId xmlns:a16="http://schemas.microsoft.com/office/drawing/2014/main" id="{E10E4CF2-B6E9-1471-5A12-272ABAA060B3}"/>
+                    </a:ext>
+                  </a:extLst>
+                </p14:cNvPr>
+                <p14:cNvContentPartPr/>
+                <p14:nvPr/>
+              </p14:nvContentPartPr>
+              <p14:xfrm>
+                <a:off x="10642593" y="2662948"/>
+                <a:ext cx="1800" cy="360"/>
+              </p14:xfrm>
+            </p:contentPart>
+          </mc:Choice>
+          <mc:Fallback>
+            <p:pic>
+              <p:nvPicPr>
+                <p:cNvPr id="21" name="Ink 20">
+                  <a:extLst>
+                    <a:ext uri="{FF2B5EF4-FFF2-40B4-BE49-F238E27FC236}">
+                      <a16:creationId xmlns:a16="http://schemas.microsoft.com/office/drawing/2014/main" id="{E10E4CF2-B6E9-1471-5A12-272ABAA060B3}"/>
+                    </a:ext>
+                  </a:extLst>
+                </p:cNvPr>
+                <p:cNvPicPr/>
+                <p:nvPr/>
+              </p:nvPicPr>
+              <p:blipFill>
+                <a:blip r:embed="rId13"/>
+                <a:stretch>
+                  <a:fillRect/>
+                </a:stretch>
+              </p:blipFill>
+              <p:spPr>
+                <a:xfrm>
+                  <a:off x="10633593" y="2654308"/>
+                  <a:ext cx="19440" cy="18000"/>
+                </a:xfrm>
+                <a:prstGeom prst="rect">
+                  <a:avLst/>
+                </a:prstGeom>
+              </p:spPr>
+            </p:pic>
+          </mc:Fallback>
+        </mc:AlternateContent>
+        <mc:AlternateContent xmlns:mc="http://schemas.openxmlformats.org/markup-compatibility/2006">
+          <mc:Choice xmlns:p14="http://schemas.microsoft.com/office/powerpoint/2010/main" Requires="p14">
+            <p:contentPart p14:bwMode="auto" r:id="rId14">
+              <p14:nvContentPartPr>
+                <p14:cNvPr id="22" name="Ink 21">
+                  <a:extLst>
+                    <a:ext uri="{FF2B5EF4-FFF2-40B4-BE49-F238E27FC236}">
+                      <a16:creationId xmlns:a16="http://schemas.microsoft.com/office/drawing/2014/main" id="{9D4DD270-1D65-7DE1-BF5A-EFFC91184CD4}"/>
+                    </a:ext>
+                  </a:extLst>
+                </p14:cNvPr>
+                <p14:cNvContentPartPr/>
+                <p14:nvPr/>
+              </p14:nvContentPartPr>
+              <p14:xfrm>
+                <a:off x="10626033" y="2662948"/>
+                <a:ext cx="360" cy="360"/>
+              </p14:xfrm>
+            </p:contentPart>
+          </mc:Choice>
+          <mc:Fallback>
+            <p:pic>
+              <p:nvPicPr>
+                <p:cNvPr id="22" name="Ink 21">
+                  <a:extLst>
+                    <a:ext uri="{FF2B5EF4-FFF2-40B4-BE49-F238E27FC236}">
+                      <a16:creationId xmlns:a16="http://schemas.microsoft.com/office/drawing/2014/main" id="{9D4DD270-1D65-7DE1-BF5A-EFFC91184CD4}"/>
+                    </a:ext>
+                  </a:extLst>
+                </p:cNvPr>
+                <p:cNvPicPr/>
+                <p:nvPr/>
+              </p:nvPicPr>
+              <p:blipFill>
+                <a:blip r:embed="rId8"/>
+                <a:stretch>
+                  <a:fillRect/>
+                </a:stretch>
+              </p:blipFill>
+              <p:spPr>
+                <a:xfrm>
+                  <a:off x="10617393" y="2654308"/>
+                  <a:ext cx="18000" cy="18000"/>
+                </a:xfrm>
+                <a:prstGeom prst="rect">
+                  <a:avLst/>
+                </a:prstGeom>
+              </p:spPr>
+            </p:pic>
+          </mc:Fallback>
+        </mc:AlternateContent>
+      </p:grpSp>
+    </p:spTree>
+    <p:extLst>
+      <p:ext uri="{BB962C8B-B14F-4D97-AF65-F5344CB8AC3E}">
+        <p14:creationId xmlns:p14="http://schemas.microsoft.com/office/powerpoint/2010/main" val="2626155325"/>
+      </p:ext>
+    </p:extLst>
+  </p:cSld>
+  <p:clrMapOvr>
+    <a:masterClrMapping/>
+  </p:clrMapOvr>
+</p:sld>
+</file>
+
+<file path=ppt/slides/slide6.xml><?xml version="1.0" encoding="utf-8"?>
+<p:sld xmlns:a="http://schemas.openxmlformats.org/drawingml/2006/main" xmlns:r="http://schemas.openxmlformats.org/officeDocument/2006/relationships" xmlns:p="http://schemas.openxmlformats.org/presentationml/2006/main">
+  <p:cSld>
+    <p:spTree>
+      <p:nvGrpSpPr>
+        <p:cNvPr id="1" name=""/>
+        <p:cNvGrpSpPr/>
+        <p:nvPr/>
+      </p:nvGrpSpPr>
+      <p:grpSpPr>
+        <a:xfrm>
+          <a:off x="0" y="0"/>
+          <a:ext cx="0" cy="0"/>
+          <a:chOff x="0" y="0"/>
+          <a:chExt cx="0" cy="0"/>
+        </a:xfrm>
+      </p:grpSpPr>
+      <p:sp>
+        <p:nvSpPr>
           <p:cNvPr id="2" name="Text Placeholder 1">
             <a:extLst>
               <a:ext uri="{FF2B5EF4-FFF2-40B4-BE49-F238E27FC236}">
@@ -6887,7 +7835,7 @@
                   <a:srgbClr val="00B0F0"/>
                 </a:solidFill>
               </a:rPr>
-              <a:t>SNEAKY score</a:t>
+              <a:t>SNEAKY score - Bias</a:t>
             </a:r>
             <a:endParaRPr lang="en-US" dirty="0"/>
           </a:p>
@@ -6908,7 +7856,7 @@
         <p:spPr>
           <a:xfrm>
             <a:off x="456182" y="2397760"/>
-            <a:ext cx="10557258" cy="3416320"/>
+            <a:ext cx="10557258" cy="4801314"/>
           </a:xfrm>
           <a:prstGeom prst="rect">
             <a:avLst/>
@@ -6927,7 +7875,7 @@
             </a:pPr>
             <a:r>
               <a:rPr lang="en-US" dirty="0"/>
-              <a:t>Where do we draw the sample from?  Secondary Car Insurance Company</a:t>
+              <a:t>Where do we draw the sample from?  A Car Insurance Company (Secondary)</a:t>
             </a:r>
           </a:p>
           <a:p>
@@ -6947,7 +7895,7 @@
             </a:pPr>
             <a:r>
               <a:rPr lang="en-US" dirty="0"/>
-              <a:t>Was it significant to add cars to predict better score?  No.  The car variable wasn’t predicting the better score than without</a:t>
+              <a:t>Was it significant to adding cars to prediction model significant?  Depending on perspective.</a:t>
             </a:r>
           </a:p>
           <a:p>
@@ -6964,8 +7912,80 @@
             </a:pPr>
             <a:r>
               <a:rPr lang="en-US" dirty="0"/>
-              <a:t>These Omitted Variable Bias were very Sneaky, in other words, it crawled upon us and produced very narrowed predictions</a:t>
-            </a:r>
+              <a:t>These Omitted Variable Bias can be very Sneaky, in other words, it can crawl upon us and produced very narrowed predictions</a:t>
+            </a:r>
+          </a:p>
+          <a:p>
+            <a:endParaRPr lang="en-US" dirty="0"/>
+          </a:p>
+          <a:p>
+            <a:pPr marL="285750" indent="-285750">
+              <a:buFont typeface="Arial" panose="020B0604020202020204" pitchFamily="34" charset="0"/>
+              <a:buChar char="•"/>
+            </a:pPr>
+            <a:r>
+              <a:rPr lang="en-US" sz="1800" dirty="0"/>
+              <a:t>The F-stat is used for testing the overall significance of the model which very high it this case.</a:t>
+            </a:r>
+          </a:p>
+          <a:p>
+            <a:endParaRPr lang="en-US" sz="1800" dirty="0"/>
+          </a:p>
+          <a:p>
+            <a:pPr marL="285750" indent="-285750">
+              <a:buFont typeface="Arial" panose="020B0604020202020204" pitchFamily="34" charset="0"/>
+              <a:buChar char="•"/>
+            </a:pPr>
+            <a:r>
+              <a:rPr lang="en-US" sz="1800" b="0" i="0" dirty="0">
+                <a:solidFill>
+                  <a:srgbClr val="202124"/>
+                </a:solidFill>
+                <a:effectLst/>
+                <a:latin typeface="Roboto" panose="02000000000000000000" pitchFamily="2" charset="0"/>
+              </a:rPr>
+              <a:t>From previous page A large F-value (94) means </a:t>
+            </a:r>
+            <a:r>
+              <a:rPr lang="en-US" sz="1800" b="1" i="0" dirty="0">
+                <a:solidFill>
+                  <a:srgbClr val="202124"/>
+                </a:solidFill>
+                <a:effectLst/>
+                <a:latin typeface="Roboto" panose="02000000000000000000" pitchFamily="2" charset="0"/>
+              </a:rPr>
+              <a:t>The signal or the differences in means is greater than would be expected by random chance</a:t>
+            </a:r>
+            <a:r>
+              <a:rPr lang="en-US" sz="1800" b="0" i="0" dirty="0">
+                <a:solidFill>
+                  <a:srgbClr val="202124"/>
+                </a:solidFill>
+                <a:effectLst/>
+                <a:latin typeface="Roboto" panose="02000000000000000000" pitchFamily="2" charset="0"/>
+              </a:rPr>
+              <a:t>. </a:t>
+            </a:r>
+            <a:r>
+              <a:rPr lang="en-US" dirty="0">
+                <a:solidFill>
+                  <a:srgbClr val="202124"/>
+                </a:solidFill>
+                <a:latin typeface="Roboto" panose="02000000000000000000" pitchFamily="2" charset="0"/>
+              </a:rPr>
+              <a:t>Therefore, we can r</a:t>
+            </a:r>
+            <a:r>
+              <a:rPr lang="en-US" sz="1800" b="0" i="0" dirty="0">
+                <a:solidFill>
+                  <a:srgbClr val="202124"/>
+                </a:solidFill>
+                <a:effectLst/>
+                <a:latin typeface="Roboto" panose="02000000000000000000" pitchFamily="2" charset="0"/>
+              </a:rPr>
+              <a:t>eject the null hypothesis (definite Consequential relationship)</a:t>
+            </a:r>
+            <a:endParaRPr lang="en-US" dirty="0"/>
           </a:p>
           <a:p>
             <a:pPr marL="342900" indent="-342900">
@@ -6981,7 +8001,7 @@
             </a:pPr>
             <a:r>
               <a:rPr lang="en-US" dirty="0"/>
-              <a:t>However, too late to go back, let’s continue.  </a:t>
+              <a:t>However, keep this numbers in mind, let’s continue.  </a:t>
             </a:r>
             <a:r>
               <a:rPr lang="en-US" dirty="0">
@@ -7020,7 +8040,7 @@
 </p:sld>
 </file>
 
-<file path=ppt/slides/slide6.xml><?xml version="1.0" encoding="utf-8"?>
+<file path=ppt/slides/slide7.xml><?xml version="1.0" encoding="utf-8"?>
 <p:sld xmlns:a="http://schemas.openxmlformats.org/drawingml/2006/main" xmlns:r="http://schemas.openxmlformats.org/officeDocument/2006/relationships" xmlns:p="http://schemas.openxmlformats.org/presentationml/2006/main">
   <p:cSld>
     <p:spTree>
@@ -7968,7 +8988,7 @@
 </p:sld>
 </file>
 
-<file path=ppt/slides/slide7.xml><?xml version="1.0" encoding="utf-8"?>
+<file path=ppt/slides/slide8.xml><?xml version="1.0" encoding="utf-8"?>
 <p:sld xmlns:a="http://schemas.openxmlformats.org/drawingml/2006/main" xmlns:r="http://schemas.openxmlformats.org/officeDocument/2006/relationships" xmlns:p="http://schemas.openxmlformats.org/presentationml/2006/main">
   <p:cSld>
     <p:spTree>
@@ -8394,15 +9414,6 @@
 </file>
 
 <file path=customXml/item2.xml><?xml version="1.0" encoding="utf-8"?>
-<?mso-contentType ?>
-<FormTemplates xmlns="http://schemas.microsoft.com/sharepoint/v3/contenttype/forms">
-  <Display>DocumentLibraryForm</Display>
-  <Edit>DocumentLibraryForm</Edit>
-  <New>DocumentLibraryForm</New>
-</FormTemplates>
-</file>
-
-<file path=customXml/item3.xml><?xml version="1.0" encoding="utf-8"?>
 <ct:contentTypeSchema xmlns:ct="http://schemas.microsoft.com/office/2006/metadata/contentType" xmlns:ma="http://schemas.microsoft.com/office/2006/metadata/properties/metaAttributes" ct:_="" ma:_="" ma:contentTypeName="Document" ma:contentTypeID="0x01010079F111ED35F8CC479449609E8A0923A6" ma:contentTypeVersion="12" ma:contentTypeDescription="Create a new document." ma:contentTypeScope="" ma:versionID="426e97fa315356fffbdcd9876fe988c2">
   <xsd:schema xmlns:xsd="http://www.w3.org/2001/XMLSchema" xmlns:xs="http://www.w3.org/2001/XMLSchema" xmlns:p="http://schemas.microsoft.com/office/2006/metadata/properties" xmlns:ns2="71af3243-3dd4-4a8d-8c0d-dd76da1f02a5" xmlns:ns3="16c05727-aa75-4e4a-9b5f-8a80a1165891" targetNamespace="http://schemas.microsoft.com/office/2006/metadata/properties" ma:root="true" ma:fieldsID="14b8f0def80e6d70ce3def20c90759ae" ns2:_="" ns3:_="">
     <xsd:import namespace="71af3243-3dd4-4a8d-8c0d-dd76da1f02a5"/>
@@ -8623,6 +9634,15 @@
 </ct:contentTypeSchema>
 </file>
 
+<file path=customXml/item3.xml><?xml version="1.0" encoding="utf-8"?>
+<?mso-contentType ?>
+<FormTemplates xmlns="http://schemas.microsoft.com/sharepoint/v3/contenttype/forms">
+  <Display>DocumentLibraryForm</Display>
+  <Edit>DocumentLibraryForm</Edit>
+  <New>DocumentLibraryForm</New>
+</FormTemplates>
+</file>
+
 <file path=customXml/itemProps1.xml><?xml version="1.0" encoding="utf-8"?>
 <ds:datastoreItem xmlns:ds="http://schemas.openxmlformats.org/officeDocument/2006/customXml" ds:itemID="{B211B2B9-8CE5-4E5A-B70F-6B056FE844E8}">
   <ds:schemaRefs>
@@ -8634,14 +9654,6 @@
 </file>
 
 <file path=customXml/itemProps2.xml><?xml version="1.0" encoding="utf-8"?>
-<ds:datastoreItem xmlns:ds="http://schemas.openxmlformats.org/officeDocument/2006/customXml" ds:itemID="{466BA265-3C9C-41FF-80C6-61A7F961C0DC}">
-  <ds:schemaRefs>
-    <ds:schemaRef ds:uri="http://schemas.microsoft.com/sharepoint/v3/contenttype/forms"/>
-  </ds:schemaRefs>
-</ds:datastoreItem>
-</file>
-
-<file path=customXml/itemProps3.xml><?xml version="1.0" encoding="utf-8"?>
 <ds:datastoreItem xmlns:ds="http://schemas.openxmlformats.org/officeDocument/2006/customXml" ds:itemID="{5055BC56-8FA3-435B-ACDD-0E8E6241EF63}">
   <ds:schemaRefs>
     <ds:schemaRef ds:uri="http://schemas.microsoft.com/office/2006/metadata/contentType"/>
@@ -8658,4 +9670,12 @@
     <ds:schemaRef ds:uri="http://schemas.microsoft.com/internal/obd"/>
   </ds:schemaRefs>
 </ds:datastoreItem>
+</file>
+
+<file path=customXml/itemProps3.xml><?xml version="1.0" encoding="utf-8"?>
+<ds:datastoreItem xmlns:ds="http://schemas.openxmlformats.org/officeDocument/2006/customXml" ds:itemID="{466BA265-3C9C-41FF-80C6-61A7F961C0DC}">
+  <ds:schemaRefs>
+    <ds:schemaRef ds:uri="http://schemas.microsoft.com/sharepoint/v3/contenttype/forms"/>
+  </ds:schemaRefs>
+</ds:datastoreItem>
 </file>
</xml_diff>